<commit_message>
chapter 7:write build tools
</commit_message>
<xml_diff>
--- a/pptx/chapter-7.pptx
+++ b/pptx/chapter-7.pptx
@@ -7,6 +7,7 @@
   <p:sldIdLst>
     <p:sldId id="258" r:id="rId2"/>
     <p:sldId id="259" r:id="rId3"/>
+    <p:sldId id="260" r:id="rId4"/>
   </p:sldIdLst>
   <p:sldSz cx="9144000" cy="6858000" type="screen4x3"/>
   <p:notesSz cx="6858000" cy="9144000"/>
@@ -4685,6 +4686,780 @@
 </p:sld>
 </file>
 
+<file path=ppt/slides/slide3.xml><?xml version="1.0" encoding="utf-8"?>
+<p:sld xmlns:a="http://schemas.openxmlformats.org/drawingml/2006/main" xmlns:r="http://schemas.openxmlformats.org/officeDocument/2006/relationships" xmlns:p="http://schemas.openxmlformats.org/presentationml/2006/main">
+  <p:cSld>
+    <p:spTree>
+      <p:nvGrpSpPr>
+        <p:cNvPr id="1" name=""/>
+        <p:cNvGrpSpPr/>
+        <p:nvPr/>
+      </p:nvGrpSpPr>
+      <p:grpSpPr>
+        <a:xfrm>
+          <a:off x="0" y="0"/>
+          <a:ext cx="0" cy="0"/>
+          <a:chOff x="0" y="0"/>
+          <a:chExt cx="0" cy="0"/>
+        </a:xfrm>
+      </p:grpSpPr>
+      <p:pic>
+        <p:nvPicPr>
+          <p:cNvPr id="2" name="図 1"/>
+          <p:cNvPicPr>
+            <a:picLocks noChangeAspect="1"/>
+          </p:cNvPicPr>
+          <p:nvPr/>
+        </p:nvPicPr>
+        <p:blipFill>
+          <a:blip r:embed="rId2">
+            <a:extLst>
+              <a:ext uri="{28A0092B-C50C-407E-A947-70E740481C1C}">
+                <a14:useLocalDpi xmlns:a14="http://schemas.microsoft.com/office/drawing/2010/main" val="0"/>
+              </a:ext>
+            </a:extLst>
+          </a:blip>
+          <a:stretch>
+            <a:fillRect/>
+          </a:stretch>
+        </p:blipFill>
+        <p:spPr>
+          <a:xfrm>
+            <a:off x="2175010" y="296794"/>
+            <a:ext cx="1002240" cy="1002240"/>
+          </a:xfrm>
+          <a:prstGeom prst="rect">
+            <a:avLst/>
+          </a:prstGeom>
+        </p:spPr>
+      </p:pic>
+      <p:cxnSp>
+        <p:nvCxnSpPr>
+          <p:cNvPr id="3" name="直線矢印コネクタ 2"/>
+          <p:cNvCxnSpPr>
+            <a:endCxn id="6" idx="1"/>
+          </p:cNvCxnSpPr>
+          <p:nvPr/>
+        </p:nvCxnSpPr>
+        <p:spPr>
+          <a:xfrm>
+            <a:off x="3033174" y="1299034"/>
+            <a:ext cx="0" cy="657600"/>
+          </a:xfrm>
+          <a:prstGeom prst="straightConnector1">
+            <a:avLst/>
+          </a:prstGeom>
+          <a:ln>
+            <a:tailEnd type="triangle"/>
+          </a:ln>
+        </p:spPr>
+        <p:style>
+          <a:lnRef idx="3">
+            <a:schemeClr val="dk1"/>
+          </a:lnRef>
+          <a:fillRef idx="0">
+            <a:schemeClr val="dk1"/>
+          </a:fillRef>
+          <a:effectRef idx="2">
+            <a:schemeClr val="dk1"/>
+          </a:effectRef>
+          <a:fontRef idx="minor">
+            <a:schemeClr val="tx1"/>
+          </a:fontRef>
+        </p:style>
+      </p:cxnSp>
+      <p:cxnSp>
+        <p:nvCxnSpPr>
+          <p:cNvPr id="4" name="直線矢印コネクタ 3"/>
+          <p:cNvCxnSpPr>
+            <a:endCxn id="2" idx="2"/>
+          </p:cNvCxnSpPr>
+          <p:nvPr/>
+        </p:nvCxnSpPr>
+        <p:spPr>
+          <a:xfrm flipV="1">
+            <a:off x="2676130" y="1299034"/>
+            <a:ext cx="0" cy="631000"/>
+          </a:xfrm>
+          <a:prstGeom prst="straightConnector1">
+            <a:avLst/>
+          </a:prstGeom>
+          <a:ln>
+            <a:tailEnd type="triangle"/>
+          </a:ln>
+        </p:spPr>
+        <p:style>
+          <a:lnRef idx="3">
+            <a:schemeClr val="dk1"/>
+          </a:lnRef>
+          <a:fillRef idx="0">
+            <a:schemeClr val="dk1"/>
+          </a:fillRef>
+          <a:effectRef idx="2">
+            <a:schemeClr val="dk1"/>
+          </a:effectRef>
+          <a:fontRef idx="minor">
+            <a:schemeClr val="tx1"/>
+          </a:fontRef>
+        </p:style>
+      </p:cxnSp>
+      <p:sp>
+        <p:nvSpPr>
+          <p:cNvPr id="5" name="テキスト ボックス 4"/>
+          <p:cNvSpPr txBox="1"/>
+          <p:nvPr/>
+        </p:nvSpPr>
+        <p:spPr>
+          <a:xfrm>
+            <a:off x="3055929" y="1429868"/>
+            <a:ext cx="1107996" cy="369332"/>
+          </a:xfrm>
+          <a:prstGeom prst="rect">
+            <a:avLst/>
+          </a:prstGeom>
+          <a:noFill/>
+        </p:spPr>
+        <p:txBody>
+          <a:bodyPr wrap="none" rtlCol="0">
+            <a:spAutoFit/>
+          </a:bodyPr>
+          <a:lstStyle/>
+          <a:p>
+            <a:r>
+              <a:rPr kumimoji="1" lang="ja-JP" altLang="en-US" dirty="0" smtClean="0"/>
+              <a:t>変更作業</a:t>
+            </a:r>
+            <a:endParaRPr kumimoji="1" lang="ja-JP" altLang="en-US" dirty="0"/>
+          </a:p>
+        </p:txBody>
+      </p:sp>
+      <p:sp>
+        <p:nvSpPr>
+          <p:cNvPr id="6" name="フローチャート: 磁気ディスク 5"/>
+          <p:cNvSpPr/>
+          <p:nvPr/>
+        </p:nvSpPr>
+        <p:spPr>
+          <a:xfrm>
+            <a:off x="2265078" y="1956634"/>
+            <a:ext cx="1536192" cy="890016"/>
+          </a:xfrm>
+          <a:prstGeom prst="flowChartMagneticDisk">
+            <a:avLst/>
+          </a:prstGeom>
+          <a:solidFill>
+            <a:srgbClr val="99FF66"/>
+          </a:solidFill>
+        </p:spPr>
+        <p:style>
+          <a:lnRef idx="1">
+            <a:schemeClr val="accent3"/>
+          </a:lnRef>
+          <a:fillRef idx="2">
+            <a:schemeClr val="accent3"/>
+          </a:fillRef>
+          <a:effectRef idx="1">
+            <a:schemeClr val="accent3"/>
+          </a:effectRef>
+          <a:fontRef idx="minor">
+            <a:schemeClr val="dk1"/>
+          </a:fontRef>
+        </p:style>
+        <p:txBody>
+          <a:bodyPr rtlCol="0" anchor="ctr"/>
+          <a:lstStyle/>
+          <a:p>
+            <a:pPr algn="ctr"/>
+            <a:r>
+              <a:rPr kumimoji="1" lang="ja-JP" altLang="en-US" dirty="0" smtClean="0"/>
+              <a:t>リポジトリー</a:t>
+            </a:r>
+            <a:endParaRPr kumimoji="1" lang="ja-JP" altLang="en-US" dirty="0"/>
+          </a:p>
+        </p:txBody>
+      </p:sp>
+      <p:sp>
+        <p:nvSpPr>
+          <p:cNvPr id="7" name="テキスト ボックス 6"/>
+          <p:cNvSpPr txBox="1"/>
+          <p:nvPr/>
+        </p:nvSpPr>
+        <p:spPr>
+          <a:xfrm>
+            <a:off x="3177250" y="597408"/>
+            <a:ext cx="877163" cy="369332"/>
+          </a:xfrm>
+          <a:prstGeom prst="rect">
+            <a:avLst/>
+          </a:prstGeom>
+          <a:noFill/>
+        </p:spPr>
+        <p:txBody>
+          <a:bodyPr wrap="none" rtlCol="0">
+            <a:spAutoFit/>
+          </a:bodyPr>
+          <a:lstStyle/>
+          <a:p>
+            <a:r>
+              <a:rPr kumimoji="1" lang="ja-JP" altLang="en-US" dirty="0" smtClean="0"/>
+              <a:t>開発者</a:t>
+            </a:r>
+            <a:endParaRPr kumimoji="1" lang="ja-JP" altLang="en-US" dirty="0"/>
+          </a:p>
+        </p:txBody>
+      </p:sp>
+      <p:sp>
+        <p:nvSpPr>
+          <p:cNvPr id="8" name="角丸四角形 7"/>
+          <p:cNvSpPr/>
+          <p:nvPr/>
+        </p:nvSpPr>
+        <p:spPr>
+          <a:xfrm>
+            <a:off x="1249146" y="3551444"/>
+            <a:ext cx="2360781" cy="719328"/>
+          </a:xfrm>
+          <a:prstGeom prst="roundRect">
+            <a:avLst/>
+          </a:prstGeom>
+        </p:spPr>
+        <p:style>
+          <a:lnRef idx="1">
+            <a:schemeClr val="accent1"/>
+          </a:lnRef>
+          <a:fillRef idx="2">
+            <a:schemeClr val="accent1"/>
+          </a:fillRef>
+          <a:effectRef idx="1">
+            <a:schemeClr val="accent1"/>
+          </a:effectRef>
+          <a:fontRef idx="minor">
+            <a:schemeClr val="dk1"/>
+          </a:fontRef>
+        </p:style>
+        <p:txBody>
+          <a:bodyPr rtlCol="0" anchor="ctr"/>
+          <a:lstStyle/>
+          <a:p>
+            <a:pPr algn="ctr"/>
+            <a:r>
+              <a:rPr kumimoji="1" lang="ja-JP" altLang="en-US" dirty="0" smtClean="0"/>
+              <a:t>自動ビルドツール</a:t>
+            </a:r>
+            <a:endParaRPr kumimoji="1" lang="ja-JP" altLang="en-US" dirty="0"/>
+          </a:p>
+        </p:txBody>
+      </p:sp>
+      <p:cxnSp>
+        <p:nvCxnSpPr>
+          <p:cNvPr id="10" name="直線矢印コネクタ 9"/>
+          <p:cNvCxnSpPr>
+            <a:stCxn id="8" idx="0"/>
+            <a:endCxn id="6" idx="3"/>
+          </p:cNvCxnSpPr>
+          <p:nvPr/>
+        </p:nvCxnSpPr>
+        <p:spPr>
+          <a:xfrm flipV="1">
+            <a:off x="2429537" y="2846650"/>
+            <a:ext cx="603637" cy="704794"/>
+          </a:xfrm>
+          <a:prstGeom prst="straightConnector1">
+            <a:avLst/>
+          </a:prstGeom>
+          <a:ln>
+            <a:prstDash val="sysDash"/>
+            <a:tailEnd type="triangle"/>
+          </a:ln>
+        </p:spPr>
+        <p:style>
+          <a:lnRef idx="3">
+            <a:schemeClr val="dk1"/>
+          </a:lnRef>
+          <a:fillRef idx="0">
+            <a:schemeClr val="dk1"/>
+          </a:fillRef>
+          <a:effectRef idx="2">
+            <a:schemeClr val="dk1"/>
+          </a:effectRef>
+          <a:fontRef idx="minor">
+            <a:schemeClr val="tx1"/>
+          </a:fontRef>
+        </p:style>
+      </p:cxnSp>
+      <p:sp>
+        <p:nvSpPr>
+          <p:cNvPr id="13" name="テキスト ボックス 12"/>
+          <p:cNvSpPr txBox="1"/>
+          <p:nvPr/>
+        </p:nvSpPr>
+        <p:spPr>
+          <a:xfrm>
+            <a:off x="1568134" y="2932274"/>
+            <a:ext cx="1107996" cy="369332"/>
+          </a:xfrm>
+          <a:prstGeom prst="rect">
+            <a:avLst/>
+          </a:prstGeom>
+          <a:noFill/>
+        </p:spPr>
+        <p:txBody>
+          <a:bodyPr wrap="none" rtlCol="0">
+            <a:spAutoFit/>
+          </a:bodyPr>
+          <a:lstStyle/>
+          <a:p>
+            <a:r>
+              <a:rPr kumimoji="1" lang="ja-JP" altLang="en-US" dirty="0" smtClean="0"/>
+              <a:t>変更確認</a:t>
+            </a:r>
+            <a:endParaRPr kumimoji="1" lang="ja-JP" altLang="en-US" dirty="0"/>
+          </a:p>
+        </p:txBody>
+      </p:sp>
+      <p:sp>
+        <p:nvSpPr>
+          <p:cNvPr id="19" name="角丸四角形 18"/>
+          <p:cNvSpPr/>
+          <p:nvPr/>
+        </p:nvSpPr>
+        <p:spPr>
+          <a:xfrm>
+            <a:off x="5232055" y="3551444"/>
+            <a:ext cx="2360781" cy="719328"/>
+          </a:xfrm>
+          <a:prstGeom prst="roundRect">
+            <a:avLst/>
+          </a:prstGeom>
+        </p:spPr>
+        <p:style>
+          <a:lnRef idx="1">
+            <a:schemeClr val="accent4"/>
+          </a:lnRef>
+          <a:fillRef idx="2">
+            <a:schemeClr val="accent4"/>
+          </a:fillRef>
+          <a:effectRef idx="1">
+            <a:schemeClr val="accent4"/>
+          </a:effectRef>
+          <a:fontRef idx="minor">
+            <a:schemeClr val="dk1"/>
+          </a:fontRef>
+        </p:style>
+        <p:txBody>
+          <a:bodyPr rtlCol="0" anchor="ctr"/>
+          <a:lstStyle/>
+          <a:p>
+            <a:pPr algn="ctr"/>
+            <a:r>
+              <a:rPr kumimoji="1" lang="ja-JP" altLang="en-US" dirty="0" smtClean="0"/>
+              <a:t>ビルドツール</a:t>
+            </a:r>
+            <a:endParaRPr kumimoji="1" lang="ja-JP" altLang="en-US" dirty="0"/>
+          </a:p>
+        </p:txBody>
+      </p:sp>
+      <p:cxnSp>
+        <p:nvCxnSpPr>
+          <p:cNvPr id="21" name="直線矢印コネクタ 20"/>
+          <p:cNvCxnSpPr>
+            <a:stCxn id="8" idx="3"/>
+            <a:endCxn id="19" idx="1"/>
+          </p:cNvCxnSpPr>
+          <p:nvPr/>
+        </p:nvCxnSpPr>
+        <p:spPr>
+          <a:xfrm>
+            <a:off x="3609927" y="3911108"/>
+            <a:ext cx="1622128" cy="0"/>
+          </a:xfrm>
+          <a:prstGeom prst="straightConnector1">
+            <a:avLst/>
+          </a:prstGeom>
+          <a:ln>
+            <a:tailEnd type="triangle"/>
+          </a:ln>
+        </p:spPr>
+        <p:style>
+          <a:lnRef idx="3">
+            <a:schemeClr val="dk1"/>
+          </a:lnRef>
+          <a:fillRef idx="0">
+            <a:schemeClr val="dk1"/>
+          </a:fillRef>
+          <a:effectRef idx="2">
+            <a:schemeClr val="dk1"/>
+          </a:effectRef>
+          <a:fontRef idx="minor">
+            <a:schemeClr val="tx1"/>
+          </a:fontRef>
+        </p:style>
+      </p:cxnSp>
+      <p:sp>
+        <p:nvSpPr>
+          <p:cNvPr id="22" name="テキスト ボックス 21"/>
+          <p:cNvSpPr txBox="1"/>
+          <p:nvPr/>
+        </p:nvSpPr>
+        <p:spPr>
+          <a:xfrm>
+            <a:off x="3801270" y="3551444"/>
+            <a:ext cx="1239442" cy="369332"/>
+          </a:xfrm>
+          <a:prstGeom prst="rect">
+            <a:avLst/>
+          </a:prstGeom>
+          <a:noFill/>
+        </p:spPr>
+        <p:txBody>
+          <a:bodyPr wrap="none" rtlCol="0">
+            <a:spAutoFit/>
+          </a:bodyPr>
+          <a:lstStyle/>
+          <a:p>
+            <a:r>
+              <a:rPr kumimoji="1" lang="ja-JP" altLang="en-US" dirty="0" smtClean="0"/>
+              <a:t>ビルド実行</a:t>
+            </a:r>
+            <a:endParaRPr kumimoji="1" lang="ja-JP" altLang="en-US" dirty="0"/>
+          </a:p>
+        </p:txBody>
+      </p:sp>
+      <p:cxnSp>
+        <p:nvCxnSpPr>
+          <p:cNvPr id="27" name="直線矢印コネクタ 26"/>
+          <p:cNvCxnSpPr>
+            <a:stCxn id="6" idx="4"/>
+            <a:endCxn id="19" idx="0"/>
+          </p:cNvCxnSpPr>
+          <p:nvPr/>
+        </p:nvCxnSpPr>
+        <p:spPr>
+          <a:xfrm>
+            <a:off x="3801270" y="2401642"/>
+            <a:ext cx="2611176" cy="1149802"/>
+          </a:xfrm>
+          <a:prstGeom prst="straightConnector1">
+            <a:avLst/>
+          </a:prstGeom>
+          <a:ln>
+            <a:tailEnd type="triangle"/>
+          </a:ln>
+        </p:spPr>
+        <p:style>
+          <a:lnRef idx="3">
+            <a:schemeClr val="dk1"/>
+          </a:lnRef>
+          <a:fillRef idx="0">
+            <a:schemeClr val="dk1"/>
+          </a:fillRef>
+          <a:effectRef idx="2">
+            <a:schemeClr val="dk1"/>
+          </a:effectRef>
+          <a:fontRef idx="minor">
+            <a:schemeClr val="tx1"/>
+          </a:fontRef>
+        </p:style>
+      </p:cxnSp>
+      <p:sp>
+        <p:nvSpPr>
+          <p:cNvPr id="32" name="テキスト ボックス 31"/>
+          <p:cNvSpPr txBox="1"/>
+          <p:nvPr/>
+        </p:nvSpPr>
+        <p:spPr>
+          <a:xfrm>
+            <a:off x="4790318" y="2451581"/>
+            <a:ext cx="1569660" cy="369332"/>
+          </a:xfrm>
+          <a:prstGeom prst="rect">
+            <a:avLst/>
+          </a:prstGeom>
+          <a:noFill/>
+        </p:spPr>
+        <p:txBody>
+          <a:bodyPr wrap="none" rtlCol="0">
+            <a:spAutoFit/>
+          </a:bodyPr>
+          <a:lstStyle/>
+          <a:p>
+            <a:r>
+              <a:rPr kumimoji="1" lang="ja-JP" altLang="en-US" dirty="0" smtClean="0"/>
+              <a:t>変更内容取得</a:t>
+            </a:r>
+            <a:endParaRPr kumimoji="1" lang="ja-JP" altLang="en-US" dirty="0"/>
+          </a:p>
+        </p:txBody>
+      </p:sp>
+      <p:sp>
+        <p:nvSpPr>
+          <p:cNvPr id="33" name="下矢印 32"/>
+          <p:cNvSpPr/>
+          <p:nvPr/>
+        </p:nvSpPr>
+        <p:spPr>
+          <a:xfrm>
+            <a:off x="6266688" y="4450080"/>
+            <a:ext cx="316992" cy="560832"/>
+          </a:xfrm>
+          <a:prstGeom prst="downArrow">
+            <a:avLst/>
+          </a:prstGeom>
+        </p:spPr>
+        <p:style>
+          <a:lnRef idx="2">
+            <a:schemeClr val="accent1">
+              <a:shade val="50000"/>
+            </a:schemeClr>
+          </a:lnRef>
+          <a:fillRef idx="1">
+            <a:schemeClr val="accent1"/>
+          </a:fillRef>
+          <a:effectRef idx="0">
+            <a:schemeClr val="accent1"/>
+          </a:effectRef>
+          <a:fontRef idx="minor">
+            <a:schemeClr val="lt1"/>
+          </a:fontRef>
+        </p:style>
+        <p:txBody>
+          <a:bodyPr rtlCol="0" anchor="ctr"/>
+          <a:lstStyle/>
+          <a:p>
+            <a:pPr algn="ctr"/>
+            <a:endParaRPr kumimoji="1" lang="ja-JP" altLang="en-US"/>
+          </a:p>
+        </p:txBody>
+      </p:sp>
+      <p:pic>
+        <p:nvPicPr>
+          <p:cNvPr id="34" name="図 33"/>
+          <p:cNvPicPr>
+            <a:picLocks noChangeAspect="1"/>
+          </p:cNvPicPr>
+          <p:nvPr/>
+        </p:nvPicPr>
+        <p:blipFill>
+          <a:blip r:embed="rId3">
+            <a:extLst>
+              <a:ext uri="{28A0092B-C50C-407E-A947-70E740481C1C}">
+                <a14:useLocalDpi xmlns:a14="http://schemas.microsoft.com/office/drawing/2010/main" val="0"/>
+              </a:ext>
+            </a:extLst>
+          </a:blip>
+          <a:stretch>
+            <a:fillRect/>
+          </a:stretch>
+        </p:blipFill>
+        <p:spPr>
+          <a:xfrm>
+            <a:off x="5915622" y="5190220"/>
+            <a:ext cx="993648" cy="1000272"/>
+          </a:xfrm>
+          <a:prstGeom prst="rect">
+            <a:avLst/>
+          </a:prstGeom>
+        </p:spPr>
+      </p:pic>
+      <p:sp>
+        <p:nvSpPr>
+          <p:cNvPr id="35" name="テキスト ボックス 34"/>
+          <p:cNvSpPr txBox="1"/>
+          <p:nvPr/>
+        </p:nvSpPr>
+        <p:spPr>
+          <a:xfrm>
+            <a:off x="6790944" y="4572000"/>
+            <a:ext cx="1763624" cy="369332"/>
+          </a:xfrm>
+          <a:prstGeom prst="rect">
+            <a:avLst/>
+          </a:prstGeom>
+          <a:noFill/>
+        </p:spPr>
+        <p:txBody>
+          <a:bodyPr wrap="none" rtlCol="0">
+            <a:spAutoFit/>
+          </a:bodyPr>
+          <a:lstStyle/>
+          <a:p>
+            <a:r>
+              <a:rPr kumimoji="1" lang="ja-JP" altLang="en-US" dirty="0" smtClean="0"/>
+              <a:t>ソフトウェア作成</a:t>
+            </a:r>
+            <a:endParaRPr kumimoji="1" lang="ja-JP" altLang="en-US" dirty="0"/>
+          </a:p>
+        </p:txBody>
+      </p:sp>
+      <p:sp>
+        <p:nvSpPr>
+          <p:cNvPr id="36" name="テキスト ボックス 35"/>
+          <p:cNvSpPr txBox="1"/>
+          <p:nvPr/>
+        </p:nvSpPr>
+        <p:spPr>
+          <a:xfrm>
+            <a:off x="6909270" y="5505690"/>
+            <a:ext cx="1301959" cy="369332"/>
+          </a:xfrm>
+          <a:prstGeom prst="rect">
+            <a:avLst/>
+          </a:prstGeom>
+          <a:noFill/>
+        </p:spPr>
+        <p:txBody>
+          <a:bodyPr wrap="none" rtlCol="0">
+            <a:spAutoFit/>
+          </a:bodyPr>
+          <a:lstStyle/>
+          <a:p>
+            <a:r>
+              <a:rPr kumimoji="1" lang="ja-JP" altLang="en-US" dirty="0" smtClean="0"/>
+              <a:t>ソフトウェア</a:t>
+            </a:r>
+            <a:endParaRPr kumimoji="1" lang="ja-JP" altLang="en-US" dirty="0"/>
+          </a:p>
+        </p:txBody>
+      </p:sp>
+      <p:pic>
+        <p:nvPicPr>
+          <p:cNvPr id="37" name="図 36"/>
+          <p:cNvPicPr>
+            <a:picLocks noChangeAspect="1"/>
+          </p:cNvPicPr>
+          <p:nvPr/>
+        </p:nvPicPr>
+        <p:blipFill>
+          <a:blip r:embed="rId4">
+            <a:extLst>
+              <a:ext uri="{28A0092B-C50C-407E-A947-70E740481C1C}">
+                <a14:useLocalDpi xmlns:a14="http://schemas.microsoft.com/office/drawing/2010/main" val="0"/>
+              </a:ext>
+            </a:extLst>
+          </a:blip>
+          <a:stretch>
+            <a:fillRect/>
+          </a:stretch>
+        </p:blipFill>
+        <p:spPr>
+          <a:xfrm>
+            <a:off x="3227427" y="5253994"/>
+            <a:ext cx="936498" cy="936498"/>
+          </a:xfrm>
+          <a:prstGeom prst="rect">
+            <a:avLst/>
+          </a:prstGeom>
+        </p:spPr>
+      </p:pic>
+      <p:cxnSp>
+        <p:nvCxnSpPr>
+          <p:cNvPr id="38" name="直線矢印コネクタ 37"/>
+          <p:cNvCxnSpPr>
+            <a:stCxn id="37" idx="3"/>
+            <a:endCxn id="34" idx="1"/>
+          </p:cNvCxnSpPr>
+          <p:nvPr/>
+        </p:nvCxnSpPr>
+        <p:spPr>
+          <a:xfrm flipV="1">
+            <a:off x="4163925" y="5690356"/>
+            <a:ext cx="1751697" cy="31887"/>
+          </a:xfrm>
+          <a:prstGeom prst="straightConnector1">
+            <a:avLst/>
+          </a:prstGeom>
+          <a:ln>
+            <a:tailEnd type="triangle"/>
+          </a:ln>
+        </p:spPr>
+        <p:style>
+          <a:lnRef idx="3">
+            <a:schemeClr val="dk1"/>
+          </a:lnRef>
+          <a:fillRef idx="0">
+            <a:schemeClr val="dk1"/>
+          </a:fillRef>
+          <a:effectRef idx="2">
+            <a:schemeClr val="dk1"/>
+          </a:effectRef>
+          <a:fontRef idx="minor">
+            <a:schemeClr val="tx1"/>
+          </a:fontRef>
+        </p:style>
+      </p:cxnSp>
+      <p:sp>
+        <p:nvSpPr>
+          <p:cNvPr id="39" name="テキスト ボックス 38"/>
+          <p:cNvSpPr txBox="1"/>
+          <p:nvPr/>
+        </p:nvSpPr>
+        <p:spPr>
+          <a:xfrm>
+            <a:off x="4440842" y="5190220"/>
+            <a:ext cx="747320" cy="369332"/>
+          </a:xfrm>
+          <a:prstGeom prst="rect">
+            <a:avLst/>
+          </a:prstGeom>
+          <a:noFill/>
+        </p:spPr>
+        <p:txBody>
+          <a:bodyPr wrap="none" rtlCol="0">
+            <a:spAutoFit/>
+          </a:bodyPr>
+          <a:lstStyle/>
+          <a:p>
+            <a:r>
+              <a:rPr kumimoji="1" lang="ja-JP" altLang="en-US" dirty="0" smtClean="0"/>
+              <a:t>テスト</a:t>
+            </a:r>
+            <a:endParaRPr kumimoji="1" lang="ja-JP" altLang="en-US" dirty="0"/>
+          </a:p>
+        </p:txBody>
+      </p:sp>
+      <p:sp>
+        <p:nvSpPr>
+          <p:cNvPr id="42" name="テキスト ボックス 41"/>
+          <p:cNvSpPr txBox="1"/>
+          <p:nvPr/>
+        </p:nvSpPr>
+        <p:spPr>
+          <a:xfrm>
+            <a:off x="2193284" y="5523458"/>
+            <a:ext cx="1032655" cy="369332"/>
+          </a:xfrm>
+          <a:prstGeom prst="rect">
+            <a:avLst/>
+          </a:prstGeom>
+          <a:noFill/>
+        </p:spPr>
+        <p:txBody>
+          <a:bodyPr wrap="none" rtlCol="0">
+            <a:spAutoFit/>
+          </a:bodyPr>
+          <a:lstStyle/>
+          <a:p>
+            <a:r>
+              <a:rPr kumimoji="1" lang="ja-JP" altLang="en-US" dirty="0" smtClean="0"/>
+              <a:t>テスター</a:t>
+            </a:r>
+            <a:endParaRPr kumimoji="1" lang="ja-JP" altLang="en-US" dirty="0"/>
+          </a:p>
+        </p:txBody>
+      </p:sp>
+    </p:spTree>
+    <p:extLst>
+      <p:ext uri="{BB962C8B-B14F-4D97-AF65-F5344CB8AC3E}">
+        <p14:creationId xmlns:p14="http://schemas.microsoft.com/office/powerpoint/2010/main" val="952755854"/>
+      </p:ext>
+    </p:extLst>
+  </p:cSld>
+  <p:clrMapOvr>
+    <a:masterClrMapping/>
+  </p:clrMapOvr>
+</p:sld>
+</file>
+
 <file path=ppt/theme/theme1.xml><?xml version="1.0" encoding="utf-8"?>
 <a:theme xmlns:a="http://schemas.openxmlformats.org/drawingml/2006/main" name="Office テーマ">
   <a:themeElements>

</xml_diff>